<commit_message>
Actualizar presentación de documentación para el formulario GET y POST en FastAPI
</commit_message>
<xml_diff>
--- a/Docs/Monolito_FastAPI_GET_POST.pptx
+++ b/Docs/Monolito_FastAPI_GET_POST.pptx
@@ -16,6 +16,7 @@
     <p:sldId id="264" r:id="rId11"/>
     <p:sldId id="265" r:id="rId12"/>
     <p:sldId id="266" r:id="rId13"/>
+    <p:sldId id="267" r:id="rId14"/>
   </p:sldIdLst>
   <p:sldSz cx="9144000" cy="6858000" type="screen4x3"/>
   <p:notesSz cx="6858000" cy="9144000"/>
@@ -3455,6 +3456,48 @@
           </a:p>
         </p:txBody>
       </p:sp>
+    </p:spTree>
+  </p:cSld>
+  <p:clrMapOvr>
+    <a:masterClrMapping/>
+  </p:clrMapOvr>
+</p:sld>
+</file>
+
+<file path=ppt/slides/slide12.xml><?xml version="1.0" encoding="utf-8"?>
+<p:sld xmlns:a="http://schemas.openxmlformats.org/drawingml/2006/main" xmlns:r="http://schemas.openxmlformats.org/officeDocument/2006/relationships" xmlns:p="http://schemas.openxmlformats.org/presentationml/2006/main">
+  <p:cSld>
+    <p:spTree>
+      <p:nvGrpSpPr>
+        <p:cNvPr id="1" name=""/>
+        <p:cNvGrpSpPr/>
+        <p:nvPr/>
+      </p:nvGrpSpPr>
+      <p:grpSpPr/>
+      <p:pic>
+        <p:nvPicPr>
+          <p:cNvPr id="4" name="Picture 3" descr="mermaid-2112025 72051"/>
+          <p:cNvPicPr>
+            <a:picLocks noChangeAspect="1"/>
+          </p:cNvPicPr>
+          <p:nvPr/>
+        </p:nvPicPr>
+        <p:blipFill>
+          <a:blip r:embed="rId1"/>
+          <a:stretch>
+            <a:fillRect/>
+          </a:stretch>
+        </p:blipFill>
+        <p:spPr>
+          <a:xfrm>
+            <a:off x="1569720" y="0"/>
+            <a:ext cx="4888865" cy="6858000"/>
+          </a:xfrm>
+          <a:prstGeom prst="rect">
+            <a:avLst/>
+          </a:prstGeom>
+        </p:spPr>
+      </p:pic>
     </p:spTree>
   </p:cSld>
   <p:clrMapOvr>

</xml_diff>